<commit_message>
Change name of template file
</commit_message>
<xml_diff>
--- a/doc/frontend/wireframe/TRN-MiniBlog_WireframeDesign_LeThanhTri.pptx
+++ b/doc/frontend/wireframe/TRN-MiniBlog_WireframeDesign_LeThanhTri.pptx
@@ -112,7 +112,7 @@
   </p:defaultTextStyle>
   <p:extLst>
     <p:ext uri="{EFAFB233-063F-42B5-8137-9DF3F51BA10A}">
-      <p15:sldGuideLst xmlns="" xmlns:p15="http://schemas.microsoft.com/office/powerpoint/2012/main">
+      <p15:sldGuideLst xmlns:p15="http://schemas.microsoft.com/office/powerpoint/2012/main" xmlns="">
         <p15:guide id="1" orient="horz" pos="2160">
           <p15:clr>
             <a:srgbClr val="A4A3A4"/>
@@ -210,7 +210,7 @@
           </a:lstStyle>
           <a:p>
             <a:fld id="{0B14D75D-3A88-044C-B530-B9A2A8B351DB}" type="datetimeFigureOut">
-              <a:t>12/26/14</a:t>
+              <a:t>1/19/15</a:t>
             </a:fld>
             <a:endParaRPr kumimoji="1" lang="ja-JP" altLang="en-US"/>
           </a:p>
@@ -667,7 +667,7 @@
                 <a:ea typeface="ＭＳ Ｐゴシック"/>
               </a:rPr>
               <a:pPr/>
-              <a:t>12/26/14</a:t>
+              <a:t>1/19/15</a:t>
             </a:fld>
             <a:endParaRPr lang="ja-JP" altLang="en-US">
               <a:solidFill>
@@ -911,7 +911,7 @@
                 <a:ea typeface="ＭＳ Ｐゴシック"/>
               </a:rPr>
               <a:pPr/>
-              <a:t>12/26/14</a:t>
+              <a:t>1/19/15</a:t>
             </a:fld>
             <a:endParaRPr lang="ja-JP" altLang="en-US">
               <a:solidFill>
@@ -1165,7 +1165,7 @@
                 <a:ea typeface="ＭＳ Ｐゴシック"/>
               </a:rPr>
               <a:pPr/>
-              <a:t>12/26/14</a:t>
+              <a:t>1/19/15</a:t>
             </a:fld>
             <a:endParaRPr lang="ja-JP" altLang="en-US">
               <a:solidFill>
@@ -1302,7 +1302,7 @@
                 <a:ea typeface="ＭＳ Ｐゴシック"/>
               </a:rPr>
               <a:pPr/>
-              <a:t>12/26/14</a:t>
+              <a:t>1/19/15</a:t>
             </a:fld>
             <a:endParaRPr lang="ja-JP" altLang="en-US">
               <a:solidFill>
@@ -1973,7 +1973,7 @@
                 <a:ea typeface="ＭＳ Ｐゴシック"/>
               </a:rPr>
               <a:pPr/>
-              <a:t>12/26/14</a:t>
+              <a:t>1/19/15</a:t>
             </a:fld>
             <a:endParaRPr lang="ja-JP" altLang="en-US">
               <a:solidFill>
@@ -2644,7 +2644,7 @@
                 <a:ea typeface="ＭＳ Ｐゴシック"/>
               </a:rPr>
               <a:pPr/>
-              <a:t>12/26/14</a:t>
+              <a:t>1/19/15</a:t>
             </a:fld>
             <a:endParaRPr lang="ja-JP" altLang="en-US">
               <a:solidFill>
@@ -3422,7 +3422,7 @@
                 <a:ea typeface="ＭＳ Ｐゴシック"/>
               </a:rPr>
               <a:pPr/>
-              <a:t>12/26/14</a:t>
+              <a:t>1/19/15</a:t>
             </a:fld>
             <a:endParaRPr lang="ja-JP" altLang="en-US">
               <a:solidFill>
@@ -3960,7 +3960,7 @@
                 <a:ea typeface="ＭＳ Ｐゴシック"/>
               </a:rPr>
               <a:pPr/>
-              <a:t>12/26/14</a:t>
+              <a:t>1/19/15</a:t>
             </a:fld>
             <a:endParaRPr lang="ja-JP" altLang="en-US">
               <a:solidFill>
@@ -4354,7 +4354,7 @@
                 <a:ea typeface="ＭＳ Ｐゴシック"/>
               </a:rPr>
               <a:pPr/>
-              <a:t>12/26/14</a:t>
+              <a:t>1/19/15</a:t>
             </a:fld>
             <a:endParaRPr lang="ja-JP" altLang="en-US">
               <a:solidFill>
@@ -5245,7 +5245,7 @@
                 <a:ea typeface="ＭＳ Ｐゴシック"/>
               </a:rPr>
               <a:pPr/>
-              <a:t>12/26/14</a:t>
+              <a:t>1/19/15</a:t>
             </a:fld>
             <a:endParaRPr lang="ja-JP" altLang="en-US">
               <a:solidFill>
@@ -5405,7 +5405,7 @@
                 <a:ea typeface="ＭＳ Ｐゴシック"/>
               </a:rPr>
               <a:pPr/>
-              <a:t>12/26/14</a:t>
+              <a:t>1/19/15</a:t>
             </a:fld>
             <a:endParaRPr lang="ja-JP" altLang="en-US">
               <a:solidFill>
@@ -5542,7 +5542,7 @@
                 <a:ea typeface="ＭＳ Ｐゴシック"/>
               </a:rPr>
               <a:pPr/>
-              <a:t>12/26/14</a:t>
+              <a:t>1/19/15</a:t>
             </a:fld>
             <a:endParaRPr lang="ja-JP" altLang="en-US">
               <a:solidFill>
@@ -5893,7 +5893,7 @@
                 <a:ea typeface="ＭＳ Ｐゴシック"/>
               </a:rPr>
               <a:pPr/>
-              <a:t>12/26/14</a:t>
+              <a:t>1/19/15</a:t>
             </a:fld>
             <a:endParaRPr lang="ja-JP" altLang="en-US">
               <a:solidFill>
@@ -6188,7 +6188,7 @@
                 <a:ea typeface="ＭＳ Ｐゴシック"/>
               </a:rPr>
               <a:pPr/>
-              <a:t>12/26/14</a:t>
+              <a:t>1/19/15</a:t>
             </a:fld>
             <a:endParaRPr lang="ja-JP" altLang="en-US">
               <a:solidFill>
@@ -6475,7 +6475,7 @@
                 <a:ea typeface="ＭＳ Ｐゴシック"/>
               </a:rPr>
               <a:pPr/>
-              <a:t>12/26/14</a:t>
+              <a:t>1/19/15</a:t>
             </a:fld>
             <a:endParaRPr kumimoji="1" lang="ja-JP" altLang="en-US">
               <a:solidFill>
@@ -7086,7 +7086,7 @@
               <a:buNone/>
             </a:pPr>
             <a:r>
-              <a:rPr lang="en-US" altLang="ja-JP" sz="900" dirty="0">
+              <a:rPr lang="en-US" altLang="ja-JP" sz="900" dirty="0" smtClean="0">
                 <a:solidFill>
                   <a:prstClr val="black"/>
                 </a:solidFill>
@@ -7094,7 +7094,18 @@
                 <a:ea typeface="メイリオ" pitchFamily="50" charset="-128"/>
                 <a:cs typeface="メイリオ" pitchFamily="50" charset="-128"/>
               </a:rPr>
-              <a:t>2014/12/08 Mulodo Inc</a:t>
+              <a:t>2015/01/19 </a:t>
+            </a:r>
+            <a:r>
+              <a:rPr lang="en-US" altLang="ja-JP" sz="900" dirty="0">
+                <a:solidFill>
+                  <a:prstClr val="black"/>
+                </a:solidFill>
+                <a:latin typeface="メイリオ" pitchFamily="50" charset="-128"/>
+                <a:ea typeface="メイリオ" pitchFamily="50" charset="-128"/>
+                <a:cs typeface="メイリオ" pitchFamily="50" charset="-128"/>
+              </a:rPr>
+              <a:t>Mulodo Inc</a:t>
             </a:r>
             <a:endParaRPr lang="ja-JP" altLang="en-US" sz="900" dirty="0">
               <a:solidFill>
@@ -7278,7 +7289,7 @@
         </p:nvCxnSpPr>
         <p:spPr>
           <a:xfrm>
-            <a:off x="1197106" y="672496"/>
+            <a:off x="1197106" y="664029"/>
             <a:ext cx="557784" cy="0"/>
           </a:xfrm>
           <a:prstGeom prst="straightConnector1">
@@ -7870,7 +7881,7 @@
         <p:spPr>
           <a:xfrm>
             <a:off x="4954153" y="1309270"/>
-            <a:ext cx="20482" cy="671359"/>
+            <a:ext cx="0" cy="804410"/>
           </a:xfrm>
           <a:prstGeom prst="line">
             <a:avLst/>
@@ -7905,7 +7916,7 @@
         </p:nvCxnSpPr>
         <p:spPr>
           <a:xfrm>
-            <a:off x="4978995" y="1968537"/>
+            <a:off x="4970528" y="1968537"/>
             <a:ext cx="557784" cy="0"/>
           </a:xfrm>
           <a:prstGeom prst="straightConnector1">
@@ -8014,9 +8025,9 @@
           <p:nvPr/>
         </p:nvCxnSpPr>
         <p:spPr>
-          <a:xfrm>
-            <a:off x="2519116" y="1303874"/>
-            <a:ext cx="20482" cy="671359"/>
+          <a:xfrm flipH="1">
+            <a:off x="2519117" y="1303874"/>
+            <a:ext cx="1" cy="702763"/>
           </a:xfrm>
           <a:prstGeom prst="line">
             <a:avLst/>

</xml_diff>